<commit_message>
April 2022 - CHOC_CA Training **update**
</commit_message>
<xml_diff>
--- a/smart-authorization-presentation.pptx
+++ b/smart-authorization-presentation.pptx
@@ -6,7 +6,7 @@
     <p:sldMasterId id="2147483660" r:id="rId2"/>
   </p:sldMasterIdLst>
   <p:notesMasterIdLst>
-    <p:notesMasterId r:id="rId139"/>
+    <p:notesMasterId r:id="rId138"/>
   </p:notesMasterIdLst>
   <p:sldIdLst>
     <p:sldId id="396" r:id="rId3"/>
@@ -139,12 +139,11 @@
     <p:sldId id="337" r:id="rId130"/>
     <p:sldId id="338" r:id="rId131"/>
     <p:sldId id="339" r:id="rId132"/>
-    <p:sldId id="333" r:id="rId133"/>
-    <p:sldId id="326" r:id="rId134"/>
-    <p:sldId id="391" r:id="rId135"/>
-    <p:sldId id="327" r:id="rId136"/>
-    <p:sldId id="328" r:id="rId137"/>
-    <p:sldId id="390" r:id="rId138"/>
+    <p:sldId id="326" r:id="rId133"/>
+    <p:sldId id="391" r:id="rId134"/>
+    <p:sldId id="327" r:id="rId135"/>
+    <p:sldId id="328" r:id="rId136"/>
+    <p:sldId id="390" r:id="rId137"/>
   </p:sldIdLst>
   <p:sldSz cx="9144000" cy="5143500" type="screen16x9"/>
   <p:notesSz cx="6858000" cy="9144000"/>
@@ -359,7 +358,7 @@
           <a:p>
             <a:fld id="{5943B5BA-8FE1-4769-B5B1-BD8C362CA2D3}" type="datetimeFigureOut">
               <a:rPr lang="en-US" smtClean="0"/>
-              <a:t>4/26/2022</a:t>
+              <a:t>4/28/2022</a:t>
             </a:fld>
             <a:endParaRPr lang="en-US"/>
           </a:p>
@@ -8222,14 +8221,7 @@
           <a:bodyPr/>
           <a:lstStyle/>
           <a:p>
-            <a:r>
-              <a:rPr lang="en-US" dirty="0"/>
-              <a:t>Similar to the user authorization workflow, fetch the FHIR Conformance document and retrieve the “token</a:t>
-            </a:r>
-            <a:r>
-              <a:rPr lang="en-US"/>
-              <a:t>” endpoint.</a:t>
-            </a:r>
+            <a:endParaRPr lang="en-US" dirty="0"/>
           </a:p>
         </p:txBody>
       </p:sp>
@@ -8259,7 +8251,7 @@
     </p:spTree>
     <p:extLst>
       <p:ext uri="{BB962C8B-B14F-4D97-AF65-F5344CB8AC3E}">
-        <p14:creationId xmlns:p14="http://schemas.microsoft.com/office/powerpoint/2010/main" val="581380717"/>
+        <p14:creationId xmlns:p14="http://schemas.microsoft.com/office/powerpoint/2010/main" val="3275023001"/>
       </p:ext>
     </p:extLst>
   </p:cSld>
@@ -8318,6 +8310,14 @@
           <a:bodyPr/>
           <a:lstStyle/>
           <a:p>
+            <a:r>
+              <a:rPr lang="en-US" dirty="0"/>
+              <a:t>Our authorization guide has more</a:t>
+            </a:r>
+            <a:r>
+              <a:rPr lang="en-US" baseline="0" dirty="0"/>
+              <a:t> comprehensive guidance on many topics, including many of the special use cases we briefly touched on today, such as OpenID Connect.  We encourage you to read these guides, as well as the underlying specifications to become more acquainted with the security models in use.</a:t>
+            </a:r>
             <a:endParaRPr lang="en-US" dirty="0"/>
           </a:p>
         </p:txBody>
@@ -8409,11 +8409,19 @@
           <a:p>
             <a:r>
               <a:rPr lang="en-US" dirty="0"/>
-              <a:t>Our authorization guide has more</a:t>
+              <a:t>Understanding the specifications and our guidance will help you in</a:t>
             </a:r>
             <a:r>
               <a:rPr lang="en-US" baseline="0" dirty="0"/>
-              <a:t> comprehensive guidance on many topics, including many of the special use cases we briefly touched on today, such as OpenID Connect.  We encourage you to read these guides, as well as the underlying specifications to become more acquainted with the security models in use.</a:t>
+              <a:t> c</a:t>
+            </a:r>
+            <a:r>
+              <a:rPr lang="en-US" dirty="0"/>
+              <a:t>reating a threat model for your</a:t>
+            </a:r>
+            <a:r>
+              <a:rPr lang="en-US" baseline="0" dirty="0"/>
+              <a:t> application; doing so can help you to identify where your risks are, and help advise end users and/or organizations as to how to best protect themselves.</a:t>
             </a:r>
             <a:endParaRPr lang="en-US" dirty="0"/>
           </a:p>
@@ -8506,19 +8514,11 @@
           <a:p>
             <a:r>
               <a:rPr lang="en-US" dirty="0"/>
-              <a:t>Understanding the specifications and our guidance will help you in</a:t>
+              <a:t>The</a:t>
             </a:r>
             <a:r>
               <a:rPr lang="en-US" baseline="0" dirty="0"/>
-              <a:t> c</a:t>
-            </a:r>
-            <a:r>
-              <a:rPr lang="en-US" dirty="0"/>
-              <a:t>reating a threat model for your</a:t>
-            </a:r>
-            <a:r>
-              <a:rPr lang="en-US" baseline="0" dirty="0"/>
-              <a:t> application; doing so can help you to identify where your risks are, and help advise end users and/or organizations as to how to best protect themselves.</a:t>
+              <a:t> OAuth2 framework is a relatively new security framework in the web industry, and relies heavily on the behaviors of user agents (browsers) and operating systems.  As this is an area that is rapidly evolving, new risks and threats may emerge that could require changes to your application to remain secure.  Staying connected with the OAuth2 and SMART on FHIR communities are the best way to ensure your application remains secure and functional.</a:t>
             </a:r>
             <a:endParaRPr lang="en-US" dirty="0"/>
           </a:p>
@@ -8609,14 +8609,6 @@
           <a:bodyPr/>
           <a:lstStyle/>
           <a:p>
-            <a:r>
-              <a:rPr lang="en-US" dirty="0"/>
-              <a:t>The</a:t>
-            </a:r>
-            <a:r>
-              <a:rPr lang="en-US" baseline="0" dirty="0"/>
-              <a:t> OAuth2 framework is a relatively new security framework in the web industry, and relies heavily on the behaviors of user agents (browsers) and operating systems.  As this is an area that is rapidly evolving, new risks and threats may emerge that could require changes to your application to remain secure.  Staying connected with the OAuth2 and SMART on FHIR communities are the best way to ensure your application remains secure and functional.</a:t>
-            </a:r>
             <a:endParaRPr lang="en-US" dirty="0"/>
           </a:p>
         </p:txBody>
@@ -8639,95 +8631,6 @@
             <a:fld id="{6B689994-7BD6-4410-875F-2CADCD92BFF6}" type="slidenum">
               <a:rPr lang="en-US" smtClean="0"/>
               <a:t>135</a:t>
-            </a:fld>
-            <a:endParaRPr lang="en-US"/>
-          </a:p>
-        </p:txBody>
-      </p:sp>
-    </p:spTree>
-    <p:extLst>
-      <p:ext uri="{BB962C8B-B14F-4D97-AF65-F5344CB8AC3E}">
-        <p14:creationId xmlns:p14="http://schemas.microsoft.com/office/powerpoint/2010/main" val="3275023001"/>
-      </p:ext>
-    </p:extLst>
-  </p:cSld>
-  <p:clrMapOvr>
-    <a:masterClrMapping/>
-  </p:clrMapOvr>
-</p:notes>
-</file>
-
-<file path=ppt/notesSlides/notesSlide86.xml><?xml version="1.0" encoding="utf-8"?>
-<p:notes xmlns:a="http://schemas.openxmlformats.org/drawingml/2006/main" xmlns:r="http://schemas.openxmlformats.org/officeDocument/2006/relationships" xmlns:p="http://schemas.openxmlformats.org/presentationml/2006/main">
-  <p:cSld>
-    <p:spTree>
-      <p:nvGrpSpPr>
-        <p:cNvPr id="1" name=""/>
-        <p:cNvGrpSpPr/>
-        <p:nvPr/>
-      </p:nvGrpSpPr>
-      <p:grpSpPr>
-        <a:xfrm>
-          <a:off x="0" y="0"/>
-          <a:ext cx="0" cy="0"/>
-          <a:chOff x="0" y="0"/>
-          <a:chExt cx="0" cy="0"/>
-        </a:xfrm>
-      </p:grpSpPr>
-      <p:sp>
-        <p:nvSpPr>
-          <p:cNvPr id="2" name="Slide Image Placeholder 1"/>
-          <p:cNvSpPr>
-            <a:spLocks noGrp="1" noRot="1" noChangeAspect="1"/>
-          </p:cNvSpPr>
-          <p:nvPr>
-            <p:ph type="sldImg"/>
-          </p:nvPr>
-        </p:nvSpPr>
-        <p:spPr>
-          <a:xfrm>
-            <a:off x="381000" y="685800"/>
-            <a:ext cx="6096000" cy="3429000"/>
-          </a:xfrm>
-        </p:spPr>
-      </p:sp>
-      <p:sp>
-        <p:nvSpPr>
-          <p:cNvPr id="3" name="Notes Placeholder 2"/>
-          <p:cNvSpPr>
-            <a:spLocks noGrp="1"/>
-          </p:cNvSpPr>
-          <p:nvPr>
-            <p:ph type="body" idx="1"/>
-          </p:nvPr>
-        </p:nvSpPr>
-        <p:spPr/>
-        <p:txBody>
-          <a:bodyPr/>
-          <a:lstStyle/>
-          <a:p>
-            <a:endParaRPr lang="en-US" dirty="0"/>
-          </a:p>
-        </p:txBody>
-      </p:sp>
-      <p:sp>
-        <p:nvSpPr>
-          <p:cNvPr id="4" name="Slide Number Placeholder 3"/>
-          <p:cNvSpPr>
-            <a:spLocks noGrp="1"/>
-          </p:cNvSpPr>
-          <p:nvPr>
-            <p:ph type="sldNum" sz="quarter" idx="10"/>
-          </p:nvPr>
-        </p:nvSpPr>
-        <p:spPr/>
-        <p:txBody>
-          <a:bodyPr/>
-          <a:lstStyle/>
-          <a:p>
-            <a:fld id="{6B689994-7BD6-4410-875F-2CADCD92BFF6}" type="slidenum">
-              <a:rPr lang="en-US" smtClean="0"/>
-              <a:t>136</a:t>
             </a:fld>
             <a:endParaRPr lang="en-US"/>
           </a:p>
@@ -9022,7 +8925,7 @@
           <a:p>
             <a:fld id="{DC509093-0A88-4CE0-881F-99629760210A}" type="datetimeFigureOut">
               <a:rPr lang="en-US" smtClean="0"/>
-              <a:t>4/26/2022</a:t>
+              <a:t>4/28/2022</a:t>
             </a:fld>
             <a:endParaRPr lang="en-US"/>
           </a:p>
@@ -9190,7 +9093,7 @@
           <a:p>
             <a:fld id="{DC509093-0A88-4CE0-881F-99629760210A}" type="datetimeFigureOut">
               <a:rPr lang="en-US" smtClean="0"/>
-              <a:t>4/26/2022</a:t>
+              <a:t>4/28/2022</a:t>
             </a:fld>
             <a:endParaRPr lang="en-US"/>
           </a:p>
@@ -9368,7 +9271,7 @@
           <a:p>
             <a:fld id="{DC509093-0A88-4CE0-881F-99629760210A}" type="datetimeFigureOut">
               <a:rPr lang="en-US" smtClean="0"/>
-              <a:t>4/26/2022</a:t>
+              <a:t>4/28/2022</a:t>
             </a:fld>
             <a:endParaRPr lang="en-US"/>
           </a:p>
@@ -10636,7 +10539,7 @@
           <a:p>
             <a:fld id="{DC509093-0A88-4CE0-881F-99629760210A}" type="datetimeFigureOut">
               <a:rPr lang="en-US" smtClean="0"/>
-              <a:t>4/26/2022</a:t>
+              <a:t>4/28/2022</a:t>
             </a:fld>
             <a:endParaRPr lang="en-US"/>
           </a:p>
@@ -11650,7 +11553,7 @@
           <a:p>
             <a:fld id="{DC509093-0A88-4CE0-881F-99629760210A}" type="datetimeFigureOut">
               <a:rPr lang="en-US" smtClean="0"/>
-              <a:t>4/26/2022</a:t>
+              <a:t>4/28/2022</a:t>
             </a:fld>
             <a:endParaRPr lang="en-US"/>
           </a:p>
@@ -11935,7 +11838,7 @@
           <a:p>
             <a:fld id="{DC509093-0A88-4CE0-881F-99629760210A}" type="datetimeFigureOut">
               <a:rPr lang="en-US" smtClean="0"/>
-              <a:t>4/26/2022</a:t>
+              <a:t>4/28/2022</a:t>
             </a:fld>
             <a:endParaRPr lang="en-US"/>
           </a:p>
@@ -12354,7 +12257,7 @@
           <a:p>
             <a:fld id="{DC509093-0A88-4CE0-881F-99629760210A}" type="datetimeFigureOut">
               <a:rPr lang="en-US" smtClean="0"/>
-              <a:t>4/26/2022</a:t>
+              <a:t>4/28/2022</a:t>
             </a:fld>
             <a:endParaRPr lang="en-US"/>
           </a:p>
@@ -12471,7 +12374,7 @@
           <a:p>
             <a:fld id="{DC509093-0A88-4CE0-881F-99629760210A}" type="datetimeFigureOut">
               <a:rPr lang="en-US" smtClean="0"/>
-              <a:t>4/26/2022</a:t>
+              <a:t>4/28/2022</a:t>
             </a:fld>
             <a:endParaRPr lang="en-US"/>
           </a:p>
@@ -12566,7 +12469,7 @@
           <a:p>
             <a:fld id="{DC509093-0A88-4CE0-881F-99629760210A}" type="datetimeFigureOut">
               <a:rPr lang="en-US" smtClean="0"/>
-              <a:t>4/26/2022</a:t>
+              <a:t>4/28/2022</a:t>
             </a:fld>
             <a:endParaRPr lang="en-US"/>
           </a:p>
@@ -12841,7 +12744,7 @@
           <a:p>
             <a:fld id="{DC509093-0A88-4CE0-881F-99629760210A}" type="datetimeFigureOut">
               <a:rPr lang="en-US" smtClean="0"/>
-              <a:t>4/26/2022</a:t>
+              <a:t>4/28/2022</a:t>
             </a:fld>
             <a:endParaRPr lang="en-US"/>
           </a:p>
@@ -13093,7 +12996,7 @@
           <a:p>
             <a:fld id="{DC509093-0A88-4CE0-881F-99629760210A}" type="datetimeFigureOut">
               <a:rPr lang="en-US" smtClean="0"/>
-              <a:t>4/26/2022</a:t>
+              <a:t>4/28/2022</a:t>
             </a:fld>
             <a:endParaRPr lang="en-US"/>
           </a:p>
@@ -13304,7 +13207,7 @@
           <a:p>
             <a:fld id="{DC509093-0A88-4CE0-881F-99629760210A}" type="datetimeFigureOut">
               <a:rPr lang="en-US" smtClean="0"/>
-              <a:t>4/26/2022</a:t>
+              <a:t>4/28/2022</a:t>
             </a:fld>
             <a:endParaRPr lang="en-US"/>
           </a:p>
@@ -14413,7 +14316,7 @@
           <a:p>
             <a:r>
               <a:rPr lang="en-US" dirty="0"/>
-              <a:t>April 29th, 2022</a:t>
+              <a:t>April 28th, 2022</a:t>
             </a:r>
           </a:p>
         </p:txBody>
@@ -17409,8 +17312,8 @@
         </p:nvSpPr>
         <p:spPr>
           <a:xfrm>
-            <a:off x="457200" y="1811122"/>
-            <a:ext cx="8153400" cy="1569660"/>
+            <a:off x="457200" y="2303563"/>
+            <a:ext cx="8153400" cy="584775"/>
           </a:xfrm>
           <a:prstGeom prst="rect">
             <a:avLst/>
@@ -17425,12 +17328,8 @@
           <a:p>
             <a:pPr algn="ctr"/>
             <a:r>
-              <a:rPr lang="en-US" sz="3200" b="1" dirty="0"/>
-              <a:t>Note</a:t>
-            </a:r>
-            <a:r>
               <a:rPr lang="en-US" sz="3200" dirty="0"/>
-              <a:t>:  Few Cerner FHIR® services currently support direct access via client credentials grant.  Additional support is coming in 2017.</a:t>
+              <a:t>Other Recommendations</a:t>
             </a:r>
           </a:p>
         </p:txBody>
@@ -17438,7 +17337,7 @@
     </p:spTree>
     <p:extLst>
       <p:ext uri="{BB962C8B-B14F-4D97-AF65-F5344CB8AC3E}">
-        <p14:creationId xmlns:p14="http://schemas.microsoft.com/office/powerpoint/2010/main" val="3727043706"/>
+        <p14:creationId xmlns:p14="http://schemas.microsoft.com/office/powerpoint/2010/main" val="3470733078"/>
       </p:ext>
     </p:extLst>
   </p:cSld>
@@ -17473,8 +17372,8 @@
         </p:nvSpPr>
         <p:spPr>
           <a:xfrm>
-            <a:off x="457200" y="2303563"/>
-            <a:ext cx="8153400" cy="584775"/>
+            <a:off x="469900" y="1318678"/>
+            <a:ext cx="8153400" cy="2554545"/>
           </a:xfrm>
           <a:prstGeom prst="rect">
             <a:avLst/>
@@ -17490,7 +17389,18 @@
             <a:pPr algn="ctr"/>
             <a:r>
               <a:rPr lang="en-US" sz="3200" dirty="0"/>
-              <a:t>Other Recommendations</a:t>
+              <a:t>Read the specifications and our comprehensive authorization guide @ fhir.cerner.com</a:t>
+            </a:r>
+          </a:p>
+          <a:p>
+            <a:pPr algn="ctr"/>
+            <a:endParaRPr lang="en-US" sz="3200" dirty="0"/>
+          </a:p>
+          <a:p>
+            <a:pPr algn="ctr"/>
+            <a:r>
+              <a:rPr lang="en-US" sz="3200" dirty="0"/>
+              <a:t>Updated guide and specifications to be published soon.</a:t>
             </a:r>
           </a:p>
         </p:txBody>
@@ -17498,7 +17408,7 @@
     </p:spTree>
     <p:extLst>
       <p:ext uri="{BB962C8B-B14F-4D97-AF65-F5344CB8AC3E}">
-        <p14:creationId xmlns:p14="http://schemas.microsoft.com/office/powerpoint/2010/main" val="3470733078"/>
+        <p14:creationId xmlns:p14="http://schemas.microsoft.com/office/powerpoint/2010/main" val="1057774442"/>
       </p:ext>
     </p:extLst>
   </p:cSld>
@@ -17533,8 +17443,8 @@
         </p:nvSpPr>
         <p:spPr>
           <a:xfrm>
-            <a:off x="469900" y="1318678"/>
-            <a:ext cx="8153400" cy="2554545"/>
+            <a:off x="457200" y="2303563"/>
+            <a:ext cx="8153400" cy="584775"/>
           </a:xfrm>
           <a:prstGeom prst="rect">
             <a:avLst/>
@@ -17550,18 +17460,7 @@
             <a:pPr algn="ctr"/>
             <a:r>
               <a:rPr lang="en-US" sz="3200" dirty="0"/>
-              <a:t>Read the specifications and our comprehensive authorization guide @ code.cerner.com</a:t>
-            </a:r>
-          </a:p>
-          <a:p>
-            <a:pPr algn="ctr"/>
-            <a:endParaRPr lang="en-US" sz="3200" dirty="0"/>
-          </a:p>
-          <a:p>
-            <a:pPr algn="ctr"/>
-            <a:r>
-              <a:rPr lang="en-US" sz="3200" dirty="0"/>
-              <a:t>Updated guide and specifications to be published soon.</a:t>
+              <a:t>Create a Threat Model for your Application</a:t>
             </a:r>
           </a:p>
         </p:txBody>
@@ -17569,7 +17468,7 @@
     </p:spTree>
     <p:extLst>
       <p:ext uri="{BB962C8B-B14F-4D97-AF65-F5344CB8AC3E}">
-        <p14:creationId xmlns:p14="http://schemas.microsoft.com/office/powerpoint/2010/main" val="1057774442"/>
+        <p14:creationId xmlns:p14="http://schemas.microsoft.com/office/powerpoint/2010/main" val="175728855"/>
       </p:ext>
     </p:extLst>
   </p:cSld>
@@ -17604,66 +17503,6 @@
         </p:nvSpPr>
         <p:spPr>
           <a:xfrm>
-            <a:off x="457200" y="2303563"/>
-            <a:ext cx="8153400" cy="584775"/>
-          </a:xfrm>
-          <a:prstGeom prst="rect">
-            <a:avLst/>
-          </a:prstGeom>
-          <a:noFill/>
-        </p:spPr>
-        <p:txBody>
-          <a:bodyPr wrap="square" rtlCol="0" anchor="ctr">
-            <a:spAutoFit/>
-          </a:bodyPr>
-          <a:lstStyle/>
-          <a:p>
-            <a:pPr algn="ctr"/>
-            <a:r>
-              <a:rPr lang="en-US" sz="3200" dirty="0"/>
-              <a:t>Create a Threat Model for your Application</a:t>
-            </a:r>
-          </a:p>
-        </p:txBody>
-      </p:sp>
-    </p:spTree>
-    <p:extLst>
-      <p:ext uri="{BB962C8B-B14F-4D97-AF65-F5344CB8AC3E}">
-        <p14:creationId xmlns:p14="http://schemas.microsoft.com/office/powerpoint/2010/main" val="175728855"/>
-      </p:ext>
-    </p:extLst>
-  </p:cSld>
-  <p:clrMapOvr>
-    <a:masterClrMapping/>
-  </p:clrMapOvr>
-</p:sld>
-</file>
-
-<file path=ppt/slides/slide135.xml><?xml version="1.0" encoding="utf-8"?>
-<p:sld xmlns:a="http://schemas.openxmlformats.org/drawingml/2006/main" xmlns:r="http://schemas.openxmlformats.org/officeDocument/2006/relationships" xmlns:p="http://schemas.openxmlformats.org/presentationml/2006/main">
-  <p:cSld>
-    <p:spTree>
-      <p:nvGrpSpPr>
-        <p:cNvPr id="1" name=""/>
-        <p:cNvGrpSpPr/>
-        <p:nvPr/>
-      </p:nvGrpSpPr>
-      <p:grpSpPr>
-        <a:xfrm>
-          <a:off x="0" y="0"/>
-          <a:ext cx="0" cy="0"/>
-          <a:chOff x="0" y="0"/>
-          <a:chExt cx="0" cy="0"/>
-        </a:xfrm>
-      </p:grpSpPr>
-      <p:sp>
-        <p:nvSpPr>
-          <p:cNvPr id="2" name="TextBox 1"/>
-          <p:cNvSpPr txBox="1"/>
-          <p:nvPr/>
-        </p:nvSpPr>
-        <p:spPr>
-          <a:xfrm>
             <a:off x="457200" y="1257123"/>
             <a:ext cx="8153400" cy="2677656"/>
           </a:xfrm>
@@ -17731,7 +17570,7 @@
 </p:sld>
 </file>
 
-<file path=ppt/slides/slide136.xml><?xml version="1.0" encoding="utf-8"?>
+<file path=ppt/slides/slide135.xml><?xml version="1.0" encoding="utf-8"?>
 <p:sld xmlns:a="http://schemas.openxmlformats.org/drawingml/2006/main" xmlns:r="http://schemas.openxmlformats.org/officeDocument/2006/relationships" xmlns:p="http://schemas.openxmlformats.org/presentationml/2006/main">
   <p:cSld>
     <p:spTree>
@@ -23429,8 +23268,8 @@
         </p:nvSpPr>
         <p:spPr>
           <a:xfrm>
-            <a:off x="457200" y="1318679"/>
-            <a:ext cx="8153400" cy="2554545"/>
+            <a:off x="457200" y="1072458"/>
+            <a:ext cx="8153400" cy="3046988"/>
           </a:xfrm>
           <a:prstGeom prst="rect">
             <a:avLst/>
@@ -23450,7 +23289,7 @@
             </a:r>
             <a:r>
               <a:rPr lang="en-US" sz="3200" dirty="0" err="1"/>
-              <a:t>MedicationHistory.read</a:t>
+              <a:t>MedicationRequest.read</a:t>
             </a:r>
             <a:endParaRPr lang="en-US" sz="3200" dirty="0"/>
           </a:p>
@@ -23530,7 +23369,7 @@
             <a:pPr algn="ctr"/>
             <a:r>
               <a:rPr lang="en-US" sz="3200" dirty="0"/>
-              <a:t>Example Scope #3: user/Immunizations.*</a:t>
+              <a:t>Example Scope #3: user/Immunization.*</a:t>
             </a:r>
           </a:p>
           <a:p>

</xml_diff>

<commit_message>
Update December 2023 v3
</commit_message>
<xml_diff>
--- a/smart-authorization-presentation.pptx
+++ b/smart-authorization-presentation.pptx
@@ -296,10 +296,40 @@
   <pc:docChgLst>
     <pc:chgData name="Heits, Brian" userId="4566fefd-61b7-4c5a-b683-1c8fdafc2832" providerId="ADAL" clId="{099831EA-F0EB-4D10-915B-905B654B5C62}"/>
     <pc:docChg chg="modSld">
-      <pc:chgData name="Heits, Brian" userId="4566fefd-61b7-4c5a-b683-1c8fdafc2832" providerId="ADAL" clId="{099831EA-F0EB-4D10-915B-905B654B5C62}" dt="2023-12-11T03:24:15.343" v="42" actId="20577"/>
+      <pc:chgData name="Heits, Brian" userId="4566fefd-61b7-4c5a-b683-1c8fdafc2832" providerId="ADAL" clId="{099831EA-F0EB-4D10-915B-905B654B5C62}" dt="2023-12-13T20:20:21.704" v="127" actId="20577"/>
       <pc:docMkLst>
         <pc:docMk/>
       </pc:docMkLst>
+      <pc:sldChg chg="modSp mod">
+        <pc:chgData name="Heits, Brian" userId="4566fefd-61b7-4c5a-b683-1c8fdafc2832" providerId="ADAL" clId="{099831EA-F0EB-4D10-915B-905B654B5C62}" dt="2023-12-13T20:20:21.704" v="127" actId="20577"/>
+        <pc:sldMkLst>
+          <pc:docMk/>
+          <pc:sldMk cId="43126427" sldId="305"/>
+        </pc:sldMkLst>
+        <pc:spChg chg="mod">
+          <ac:chgData name="Heits, Brian" userId="4566fefd-61b7-4c5a-b683-1c8fdafc2832" providerId="ADAL" clId="{099831EA-F0EB-4D10-915B-905B654B5C62}" dt="2023-12-13T20:20:21.704" v="127" actId="20577"/>
+          <ac:spMkLst>
+            <pc:docMk/>
+            <pc:sldMk cId="43126427" sldId="305"/>
+            <ac:spMk id="2" creationId="{00000000-0000-0000-0000-000000000000}"/>
+          </ac:spMkLst>
+        </pc:spChg>
+      </pc:sldChg>
+      <pc:sldChg chg="modSp mod">
+        <pc:chgData name="Heits, Brian" userId="4566fefd-61b7-4c5a-b683-1c8fdafc2832" providerId="ADAL" clId="{099831EA-F0EB-4D10-915B-905B654B5C62}" dt="2023-12-13T20:20:02.088" v="126" actId="20577"/>
+        <pc:sldMkLst>
+          <pc:docMk/>
+          <pc:sldMk cId="676933250" sldId="323"/>
+        </pc:sldMkLst>
+        <pc:spChg chg="mod">
+          <ac:chgData name="Heits, Brian" userId="4566fefd-61b7-4c5a-b683-1c8fdafc2832" providerId="ADAL" clId="{099831EA-F0EB-4D10-915B-905B654B5C62}" dt="2023-12-13T20:20:02.088" v="126" actId="20577"/>
+          <ac:spMkLst>
+            <pc:docMk/>
+            <pc:sldMk cId="676933250" sldId="323"/>
+            <ac:spMk id="2" creationId="{00000000-0000-0000-0000-000000000000}"/>
+          </ac:spMkLst>
+        </pc:spChg>
+      </pc:sldChg>
       <pc:sldChg chg="modSp mod">
         <pc:chgData name="Heits, Brian" userId="4566fefd-61b7-4c5a-b683-1c8fdafc2832" providerId="ADAL" clId="{099831EA-F0EB-4D10-915B-905B654B5C62}" dt="2023-12-11T03:24:15.343" v="42" actId="20577"/>
         <pc:sldMkLst>
@@ -443,7 +473,7 @@
           <a:p>
             <a:fld id="{5943B5BA-8FE1-4769-B5B1-BD8C362CA2D3}" type="datetimeFigureOut">
               <a:rPr lang="en-US" smtClean="0"/>
-              <a:t>12/10/2023</a:t>
+              <a:t>12/13/2023</a:t>
             </a:fld>
             <a:endParaRPr lang="en-US"/>
           </a:p>
@@ -9029,7 +9059,7 @@
           <a:p>
             <a:fld id="{DC509093-0A88-4CE0-881F-99629760210A}" type="datetimeFigureOut">
               <a:rPr lang="en-US" smtClean="0"/>
-              <a:t>12/10/2023</a:t>
+              <a:t>12/13/2023</a:t>
             </a:fld>
             <a:endParaRPr lang="en-US"/>
           </a:p>
@@ -9197,7 +9227,7 @@
           <a:p>
             <a:fld id="{DC509093-0A88-4CE0-881F-99629760210A}" type="datetimeFigureOut">
               <a:rPr lang="en-US" smtClean="0"/>
-              <a:t>12/10/2023</a:t>
+              <a:t>12/13/2023</a:t>
             </a:fld>
             <a:endParaRPr lang="en-US"/>
           </a:p>
@@ -9375,7 +9405,7 @@
           <a:p>
             <a:fld id="{DC509093-0A88-4CE0-881F-99629760210A}" type="datetimeFigureOut">
               <a:rPr lang="en-US" smtClean="0"/>
-              <a:t>12/10/2023</a:t>
+              <a:t>12/13/2023</a:t>
             </a:fld>
             <a:endParaRPr lang="en-US"/>
           </a:p>
@@ -10643,7 +10673,7 @@
           <a:p>
             <a:fld id="{DC509093-0A88-4CE0-881F-99629760210A}" type="datetimeFigureOut">
               <a:rPr lang="en-US" smtClean="0"/>
-              <a:t>12/10/2023</a:t>
+              <a:t>12/13/2023</a:t>
             </a:fld>
             <a:endParaRPr lang="en-US"/>
           </a:p>
@@ -11657,7 +11687,7 @@
           <a:p>
             <a:fld id="{DC509093-0A88-4CE0-881F-99629760210A}" type="datetimeFigureOut">
               <a:rPr lang="en-US" smtClean="0"/>
-              <a:t>12/10/2023</a:t>
+              <a:t>12/13/2023</a:t>
             </a:fld>
             <a:endParaRPr lang="en-US"/>
           </a:p>
@@ -11942,7 +11972,7 @@
           <a:p>
             <a:fld id="{DC509093-0A88-4CE0-881F-99629760210A}" type="datetimeFigureOut">
               <a:rPr lang="en-US" smtClean="0"/>
-              <a:t>12/10/2023</a:t>
+              <a:t>12/13/2023</a:t>
             </a:fld>
             <a:endParaRPr lang="en-US"/>
           </a:p>
@@ -12361,7 +12391,7 @@
           <a:p>
             <a:fld id="{DC509093-0A88-4CE0-881F-99629760210A}" type="datetimeFigureOut">
               <a:rPr lang="en-US" smtClean="0"/>
-              <a:t>12/10/2023</a:t>
+              <a:t>12/13/2023</a:t>
             </a:fld>
             <a:endParaRPr lang="en-US"/>
           </a:p>
@@ -12478,7 +12508,7 @@
           <a:p>
             <a:fld id="{DC509093-0A88-4CE0-881F-99629760210A}" type="datetimeFigureOut">
               <a:rPr lang="en-US" smtClean="0"/>
-              <a:t>12/10/2023</a:t>
+              <a:t>12/13/2023</a:t>
             </a:fld>
             <a:endParaRPr lang="en-US"/>
           </a:p>
@@ -12573,7 +12603,7 @@
           <a:p>
             <a:fld id="{DC509093-0A88-4CE0-881F-99629760210A}" type="datetimeFigureOut">
               <a:rPr lang="en-US" smtClean="0"/>
-              <a:t>12/10/2023</a:t>
+              <a:t>12/13/2023</a:t>
             </a:fld>
             <a:endParaRPr lang="en-US"/>
           </a:p>
@@ -12848,7 +12878,7 @@
           <a:p>
             <a:fld id="{DC509093-0A88-4CE0-881F-99629760210A}" type="datetimeFigureOut">
               <a:rPr lang="en-US" smtClean="0"/>
-              <a:t>12/10/2023</a:t>
+              <a:t>12/13/2023</a:t>
             </a:fld>
             <a:endParaRPr lang="en-US"/>
           </a:p>
@@ -13100,7 +13130,7 @@
           <a:p>
             <a:fld id="{DC509093-0A88-4CE0-881F-99629760210A}" type="datetimeFigureOut">
               <a:rPr lang="en-US" smtClean="0"/>
-              <a:t>12/10/2023</a:t>
+              <a:t>12/13/2023</a:t>
             </a:fld>
             <a:endParaRPr lang="en-US"/>
           </a:p>
@@ -13311,7 +13341,7 @@
           <a:p>
             <a:fld id="{DC509093-0A88-4CE0-881F-99629760210A}" type="datetimeFigureOut">
               <a:rPr lang="en-US" smtClean="0"/>
-              <a:t>12/10/2023</a:t>
+              <a:t>12/13/2023</a:t>
             </a:fld>
             <a:endParaRPr lang="en-US"/>
           </a:p>
@@ -14677,7 +14707,7 @@
             <a:pPr algn="ctr"/>
             <a:r>
               <a:rPr lang="en-US" sz="3200" dirty="0"/>
-              <a:t>Asides from the access token, the token response can contain a number of additional items.</a:t>
+              <a:t>Aside from the access token, the token response can contain a number of additional items.</a:t>
             </a:r>
             <a:endParaRPr lang="en-US" dirty="0">
               <a:latin typeface="Consolas" panose="020B0609020204030204" pitchFamily="49" charset="0"/>
@@ -16284,8 +16314,8 @@
         </p:nvSpPr>
         <p:spPr>
           <a:xfrm>
-            <a:off x="457200" y="1564906"/>
-            <a:ext cx="8153400" cy="2062103"/>
+            <a:off x="457200" y="1811127"/>
+            <a:ext cx="8153400" cy="1569660"/>
           </a:xfrm>
           <a:prstGeom prst="rect">
             <a:avLst/>
@@ -16301,23 +16331,7 @@
             <a:pPr algn="ctr"/>
             <a:r>
               <a:rPr lang="en-US" sz="3200" dirty="0"/>
-              <a:t>Refresh token responses do not contain additional response parameters that were included in the original grant, such as </a:t>
-            </a:r>
-            <a:r>
-              <a:rPr lang="en-US" sz="3200" dirty="0" err="1"/>
-              <a:t>id_token</a:t>
-            </a:r>
-            <a:r>
-              <a:rPr lang="en-US" sz="3200" dirty="0"/>
-              <a:t>, </a:t>
-            </a:r>
-            <a:r>
-              <a:rPr lang="en-US" sz="3200" dirty="0" err="1"/>
-              <a:t>patient_id</a:t>
-            </a:r>
-            <a:r>
-              <a:rPr lang="en-US" sz="3200" dirty="0"/>
-              <a:t>, or </a:t>
+              <a:t>Refresh token responses do not contain the </a:t>
             </a:r>
             <a:r>
               <a:rPr lang="en-US" sz="3200" dirty="0" err="1"/>
@@ -16325,7 +16339,7 @@
             </a:r>
             <a:r>
               <a:rPr lang="en-US" sz="3200" dirty="0"/>
-              <a:t>.</a:t>
+              <a:t> with the new access token.  This should be stored into cookies/cache within app.</a:t>
             </a:r>
             <a:endParaRPr lang="en-US" dirty="0">
               <a:latin typeface="Consolas" panose="020B0609020204030204" pitchFamily="49" charset="0"/>

</xml_diff>

<commit_message>
Update September 2024 (v2)
</commit_message>
<xml_diff>
--- a/smart-authorization-presentation.pptx
+++ b/smart-authorization-presentation.pptx
@@ -473,7 +473,7 @@
           <a:p>
             <a:fld id="{5943B5BA-8FE1-4769-B5B1-BD8C362CA2D3}" type="datetimeFigureOut">
               <a:rPr lang="en-US" smtClean="0"/>
-              <a:t>9/16/2024</a:t>
+              <a:t>9/19/2024</a:t>
             </a:fld>
             <a:endParaRPr lang="en-US"/>
           </a:p>
@@ -9059,7 +9059,7 @@
           <a:p>
             <a:fld id="{DC509093-0A88-4CE0-881F-99629760210A}" type="datetimeFigureOut">
               <a:rPr lang="en-US" smtClean="0"/>
-              <a:t>9/16/2024</a:t>
+              <a:t>9/19/2024</a:t>
             </a:fld>
             <a:endParaRPr lang="en-US"/>
           </a:p>
@@ -9227,7 +9227,7 @@
           <a:p>
             <a:fld id="{DC509093-0A88-4CE0-881F-99629760210A}" type="datetimeFigureOut">
               <a:rPr lang="en-US" smtClean="0"/>
-              <a:t>9/16/2024</a:t>
+              <a:t>9/19/2024</a:t>
             </a:fld>
             <a:endParaRPr lang="en-US"/>
           </a:p>
@@ -9405,7 +9405,7 @@
           <a:p>
             <a:fld id="{DC509093-0A88-4CE0-881F-99629760210A}" type="datetimeFigureOut">
               <a:rPr lang="en-US" smtClean="0"/>
-              <a:t>9/16/2024</a:t>
+              <a:t>9/19/2024</a:t>
             </a:fld>
             <a:endParaRPr lang="en-US"/>
           </a:p>
@@ -10673,7 +10673,7 @@
           <a:p>
             <a:fld id="{DC509093-0A88-4CE0-881F-99629760210A}" type="datetimeFigureOut">
               <a:rPr lang="en-US" smtClean="0"/>
-              <a:t>9/16/2024</a:t>
+              <a:t>9/19/2024</a:t>
             </a:fld>
             <a:endParaRPr lang="en-US"/>
           </a:p>
@@ -11687,7 +11687,7 @@
           <a:p>
             <a:fld id="{DC509093-0A88-4CE0-881F-99629760210A}" type="datetimeFigureOut">
               <a:rPr lang="en-US" smtClean="0"/>
-              <a:t>9/16/2024</a:t>
+              <a:t>9/19/2024</a:t>
             </a:fld>
             <a:endParaRPr lang="en-US"/>
           </a:p>
@@ -11972,7 +11972,7 @@
           <a:p>
             <a:fld id="{DC509093-0A88-4CE0-881F-99629760210A}" type="datetimeFigureOut">
               <a:rPr lang="en-US" smtClean="0"/>
-              <a:t>9/16/2024</a:t>
+              <a:t>9/19/2024</a:t>
             </a:fld>
             <a:endParaRPr lang="en-US"/>
           </a:p>
@@ -12391,7 +12391,7 @@
           <a:p>
             <a:fld id="{DC509093-0A88-4CE0-881F-99629760210A}" type="datetimeFigureOut">
               <a:rPr lang="en-US" smtClean="0"/>
-              <a:t>9/16/2024</a:t>
+              <a:t>9/19/2024</a:t>
             </a:fld>
             <a:endParaRPr lang="en-US"/>
           </a:p>
@@ -12508,7 +12508,7 @@
           <a:p>
             <a:fld id="{DC509093-0A88-4CE0-881F-99629760210A}" type="datetimeFigureOut">
               <a:rPr lang="en-US" smtClean="0"/>
-              <a:t>9/16/2024</a:t>
+              <a:t>9/19/2024</a:t>
             </a:fld>
             <a:endParaRPr lang="en-US"/>
           </a:p>
@@ -12603,7 +12603,7 @@
           <a:p>
             <a:fld id="{DC509093-0A88-4CE0-881F-99629760210A}" type="datetimeFigureOut">
               <a:rPr lang="en-US" smtClean="0"/>
-              <a:t>9/16/2024</a:t>
+              <a:t>9/19/2024</a:t>
             </a:fld>
             <a:endParaRPr lang="en-US"/>
           </a:p>
@@ -12878,7 +12878,7 @@
           <a:p>
             <a:fld id="{DC509093-0A88-4CE0-881F-99629760210A}" type="datetimeFigureOut">
               <a:rPr lang="en-US" smtClean="0"/>
-              <a:t>9/16/2024</a:t>
+              <a:t>9/19/2024</a:t>
             </a:fld>
             <a:endParaRPr lang="en-US"/>
           </a:p>
@@ -13130,7 +13130,7 @@
           <a:p>
             <a:fld id="{DC509093-0A88-4CE0-881F-99629760210A}" type="datetimeFigureOut">
               <a:rPr lang="en-US" smtClean="0"/>
-              <a:t>9/16/2024</a:t>
+              <a:t>9/19/2024</a:t>
             </a:fld>
             <a:endParaRPr lang="en-US"/>
           </a:p>
@@ -13341,7 +13341,7 @@
           <a:p>
             <a:fld id="{DC509093-0A88-4CE0-881F-99629760210A}" type="datetimeFigureOut">
               <a:rPr lang="en-US" smtClean="0"/>
-              <a:t>9/16/2024</a:t>
+              <a:t>9/19/2024</a:t>
             </a:fld>
             <a:endParaRPr lang="en-US"/>
           </a:p>
@@ -17738,8 +17738,15 @@
             <a:pPr algn="ctr"/>
             <a:r>
               <a:rPr lang="en-US" sz="3200" dirty="0"/>
-              <a:t>Read the specifications and our comprehensive authorization guide @ fhir.cerner.com</a:t>
-            </a:r>
+              <a:t>Read the specifications and our comprehensive </a:t>
+            </a:r>
+            <a:r>
+              <a:rPr lang="en-US" sz="3200" dirty="0">
+                <a:hlinkClick r:id="rId3"/>
+              </a:rPr>
+              <a:t>authorization guide</a:t>
+            </a:r>
+            <a:endParaRPr lang="en-US" sz="3200" dirty="0"/>
           </a:p>
           <a:p>
             <a:pPr algn="ctr"/>
@@ -18374,8 +18381,8 @@
         </p:nvSpPr>
         <p:spPr>
           <a:xfrm>
-            <a:off x="457200" y="1072458"/>
-            <a:ext cx="8153400" cy="3046988"/>
+            <a:off x="457200" y="580016"/>
+            <a:ext cx="8153400" cy="4031873"/>
           </a:xfrm>
           <a:prstGeom prst="rect">
             <a:avLst/>
@@ -18404,7 +18411,7 @@
               <a:rPr lang="en-US" sz="3200" dirty="0">
                 <a:hlinkClick r:id="rId2"/>
               </a:rPr>
-              <a:t>https://fhir.cerner.com/authorization/</a:t>
+              <a:t>https://docs.oracle.com/en/industries/health/millennium-platform-apis/fhir-authorization-framework/#authorization</a:t>
             </a:r>
             <a:endParaRPr lang="en-US" sz="3200" dirty="0"/>
           </a:p>

</xml_diff>